<commit_message>
✨ 25-04-25 JS, TS 수업
</commit_message>
<xml_diff>
--- a/PPT/04.자바스크립트 - 클로저.pptx
+++ b/PPT/04.자바스크립트 - 클로저.pptx
@@ -7215,7 +7215,7 @@
             <a:fld id="{C5EB0431-1611-1744-95F0-8172773087C5}" type="datetimeFigureOut">
               <a:rPr lang="en-US" altLang="ko-Kore-KR" smtClean="0"/>
               <a:pPr/>
-              <a:t>4/24/2025</a:t>
+              <a:t>4/25/2025</a:t>
             </a:fld>
             <a:endParaRPr lang="ko-Kore-KR"/>
           </a:p>
@@ -7635,7 +7635,7 @@
           <a:p>
             <a:fld id="{5FD0AF26-B2D6-41C9-847A-12B3D1677265}" type="datetime1">
               <a:rPr kumimoji="1" lang="ko-KR" altLang="en-US" smtClean="0"/>
-              <a:t>2025-04-24</a:t>
+              <a:t>2025-04-25</a:t>
             </a:fld>
             <a:endParaRPr kumimoji="1" lang="ko-KR" altLang="en-US"/>
           </a:p>
@@ -7833,7 +7833,7 @@
           <a:p>
             <a:fld id="{11A845FB-4EAB-4F93-BE87-891FAC391B0C}" type="datetime1">
               <a:rPr kumimoji="1" lang="ko-KR" altLang="en-US" smtClean="0"/>
-              <a:t>2025-04-24</a:t>
+              <a:t>2025-04-25</a:t>
             </a:fld>
             <a:endParaRPr kumimoji="1" lang="ko-KR" altLang="en-US"/>
           </a:p>
@@ -8041,7 +8041,7 @@
           <a:p>
             <a:fld id="{6597FBCF-59BC-423C-A27E-A4E0342EEDF5}" type="datetime1">
               <a:rPr kumimoji="1" lang="ko-KR" altLang="en-US" smtClean="0"/>
-              <a:t>2025-04-24</a:t>
+              <a:t>2025-04-25</a:t>
             </a:fld>
             <a:endParaRPr kumimoji="1" lang="ko-KR" altLang="en-US"/>
           </a:p>
@@ -8239,7 +8239,7 @@
           <a:p>
             <a:fld id="{59DE6E8A-4C0D-4CC6-BBD6-2F945A6B3540}" type="datetime1">
               <a:rPr kumimoji="1" lang="ko-KR" altLang="en-US" smtClean="0"/>
-              <a:t>2025-04-24</a:t>
+              <a:t>2025-04-25</a:t>
             </a:fld>
             <a:endParaRPr kumimoji="1" lang="ko-KR" altLang="en-US"/>
           </a:p>
@@ -8514,7 +8514,7 @@
           <a:p>
             <a:fld id="{BEBFBD75-CCBA-4C22-86CA-859D220600AA}" type="datetime1">
               <a:rPr kumimoji="1" lang="ko-KR" altLang="en-US" smtClean="0"/>
-              <a:t>2025-04-24</a:t>
+              <a:t>2025-04-25</a:t>
             </a:fld>
             <a:endParaRPr kumimoji="1" lang="ko-KR" altLang="en-US"/>
           </a:p>
@@ -8779,7 +8779,7 @@
           <a:p>
             <a:fld id="{DB031150-5CB0-41C0-9104-5695DD253F49}" type="datetime1">
               <a:rPr kumimoji="1" lang="ko-KR" altLang="en-US" smtClean="0"/>
-              <a:t>2025-04-24</a:t>
+              <a:t>2025-04-25</a:t>
             </a:fld>
             <a:endParaRPr kumimoji="1" lang="ko-KR" altLang="en-US"/>
           </a:p>
@@ -9191,7 +9191,7 @@
           <a:p>
             <a:fld id="{0B78CFAD-1435-498E-ACFE-38131B135631}" type="datetime1">
               <a:rPr kumimoji="1" lang="ko-KR" altLang="en-US" smtClean="0"/>
-              <a:t>2025-04-24</a:t>
+              <a:t>2025-04-25</a:t>
             </a:fld>
             <a:endParaRPr kumimoji="1" lang="ko-KR" altLang="en-US"/>
           </a:p>
@@ -9332,7 +9332,7 @@
           <a:p>
             <a:fld id="{BF2AA6DB-F13D-4C47-BC2B-E1D25CB476ED}" type="datetime1">
               <a:rPr kumimoji="1" lang="ko-KR" altLang="en-US" smtClean="0"/>
-              <a:t>2025-04-24</a:t>
+              <a:t>2025-04-25</a:t>
             </a:fld>
             <a:endParaRPr kumimoji="1" lang="ko-KR" altLang="en-US"/>
           </a:p>
@@ -9445,7 +9445,7 @@
           <a:p>
             <a:fld id="{14FBB438-2880-4761-94BA-7F7996C8C3BD}" type="datetime1">
               <a:rPr kumimoji="1" lang="ko-KR" altLang="en-US" smtClean="0"/>
-              <a:t>2025-04-24</a:t>
+              <a:t>2025-04-25</a:t>
             </a:fld>
             <a:endParaRPr kumimoji="1" lang="ko-KR" altLang="en-US"/>
           </a:p>
@@ -9756,7 +9756,7 @@
           <a:p>
             <a:fld id="{C4D9C33D-E09A-4F6E-A7FA-CF959C3E6DEE}" type="datetime1">
               <a:rPr kumimoji="1" lang="ko-KR" altLang="en-US" smtClean="0"/>
-              <a:t>2025-04-24</a:t>
+              <a:t>2025-04-25</a:t>
             </a:fld>
             <a:endParaRPr kumimoji="1" lang="ko-KR" altLang="en-US"/>
           </a:p>
@@ -10044,7 +10044,7 @@
           <a:p>
             <a:fld id="{DB10E3DE-CCA8-4CB9-BDA2-4741B0CD6641}" type="datetime1">
               <a:rPr kumimoji="1" lang="ko-KR" altLang="en-US" smtClean="0"/>
-              <a:t>2025-04-24</a:t>
+              <a:t>2025-04-25</a:t>
             </a:fld>
             <a:endParaRPr kumimoji="1" lang="ko-KR" altLang="en-US"/>
           </a:p>
@@ -10287,7 +10287,7 @@
           <a:p>
             <a:fld id="{827CA893-2A65-4E72-A022-7CB16F3818A4}" type="datetime1">
               <a:rPr kumimoji="1" lang="ko-KR" altLang="en-US" smtClean="0"/>
-              <a:t>2025-04-24</a:t>
+              <a:t>2025-04-25</a:t>
             </a:fld>
             <a:endParaRPr kumimoji="1" lang="ko-KR" altLang="en-US"/>
           </a:p>
@@ -11432,7 +11432,7 @@
           <a:lstStyle/>
           <a:p>
             <a:r>
-              <a:rPr lang="en-US" altLang="ko-KR" b="0">
+              <a:rPr lang="en-US" altLang="ko-KR" b="0" dirty="0" err="1">
                 <a:solidFill>
                   <a:srgbClr val="000000"/>
                 </a:solidFill>
@@ -11440,10 +11440,21 @@
                 <a:latin typeface="Consolas" panose="020B0609020204030204" pitchFamily="49" charset="0"/>
                 <a:ea typeface="Noto Sans CJK KR Regular" panose="020B0500000000000000" pitchFamily="34" charset="-127"/>
               </a:rPr>
-              <a:t>Function.prototype.memoize = </a:t>
-            </a:r>
-            <a:r>
-              <a:rPr lang="en-US" altLang="ko-KR" b="0">
+              <a:t>Function.prototype.memoize</a:t>
+            </a:r>
+            <a:r>
+              <a:rPr lang="en-US" altLang="ko-KR" b="0" dirty="0">
+                <a:solidFill>
+                  <a:srgbClr val="000000"/>
+                </a:solidFill>
+                <a:effectLst/>
+                <a:latin typeface="Consolas" panose="020B0609020204030204" pitchFamily="49" charset="0"/>
+                <a:ea typeface="Noto Sans CJK KR Regular" panose="020B0500000000000000" pitchFamily="34" charset="-127"/>
+              </a:rPr>
+              <a:t> = </a:t>
+            </a:r>
+            <a:r>
+              <a:rPr lang="en-US" altLang="ko-KR" b="0" dirty="0">
                 <a:solidFill>
                   <a:srgbClr val="0000FF"/>
                 </a:solidFill>
@@ -11454,7 +11465,7 @@
               <a:t>function</a:t>
             </a:r>
             <a:r>
-              <a:rPr lang="en-US" altLang="ko-KR" b="0">
+              <a:rPr lang="en-US" altLang="ko-KR" b="0" dirty="0">
                 <a:solidFill>
                   <a:srgbClr val="000000"/>
                 </a:solidFill>
@@ -11467,7 +11478,7 @@
           </a:p>
           <a:p>
             <a:r>
-              <a:rPr lang="en-US" altLang="ko-KR" b="0">
+              <a:rPr lang="en-US" altLang="ko-KR" b="0" dirty="0">
                 <a:solidFill>
                   <a:srgbClr val="000000"/>
                 </a:solidFill>
@@ -11478,7 +11489,7 @@
               <a:t>  </a:t>
             </a:r>
             <a:r>
-              <a:rPr lang="en-US" altLang="ko-KR">
+              <a:rPr lang="en-US" altLang="ko-KR" dirty="0">
                 <a:solidFill>
                   <a:srgbClr val="0000FF"/>
                 </a:solidFill>
@@ -11487,7 +11498,7 @@
               <a:t>const</a:t>
             </a:r>
             <a:r>
-              <a:rPr lang="en-US" altLang="ko-KR" b="0">
+              <a:rPr lang="en-US" altLang="ko-KR" b="0" dirty="0">
                 <a:solidFill>
                   <a:srgbClr val="000000"/>
                 </a:solidFill>
@@ -11495,10 +11506,32 @@
                 <a:latin typeface="Consolas" panose="020B0609020204030204" pitchFamily="49" charset="0"/>
                 <a:ea typeface="Noto Sans CJK KR Regular" panose="020B0500000000000000" pitchFamily="34" charset="-127"/>
               </a:rPr>
-              <a:t> fn = </a:t>
-            </a:r>
-            <a:r>
-              <a:rPr lang="en-US" altLang="ko-KR" b="0">
+              <a:t> </a:t>
+            </a:r>
+            <a:r>
+              <a:rPr lang="en-US" altLang="ko-KR" b="0" dirty="0" err="1">
+                <a:solidFill>
+                  <a:srgbClr val="000000"/>
+                </a:solidFill>
+                <a:effectLst/>
+                <a:latin typeface="Consolas" panose="020B0609020204030204" pitchFamily="49" charset="0"/>
+                <a:ea typeface="Noto Sans CJK KR Regular" panose="020B0500000000000000" pitchFamily="34" charset="-127"/>
+              </a:rPr>
+              <a:t>fn</a:t>
+            </a:r>
+            <a:r>
+              <a:rPr lang="en-US" altLang="ko-KR" b="0" dirty="0">
+                <a:solidFill>
+                  <a:srgbClr val="000000"/>
+                </a:solidFill>
+                <a:effectLst/>
+                <a:latin typeface="Consolas" panose="020B0609020204030204" pitchFamily="49" charset="0"/>
+                <a:ea typeface="Noto Sans CJK KR Regular" panose="020B0500000000000000" pitchFamily="34" charset="-127"/>
+              </a:rPr>
+              <a:t> = </a:t>
+            </a:r>
+            <a:r>
+              <a:rPr lang="en-US" altLang="ko-KR" b="0" dirty="0">
                 <a:solidFill>
                   <a:srgbClr val="0000FF"/>
                 </a:solidFill>
@@ -11509,7 +11542,7 @@
               <a:t>this</a:t>
             </a:r>
             <a:r>
-              <a:rPr lang="en-US" altLang="ko-KR" b="0">
+              <a:rPr lang="en-US" altLang="ko-KR" b="0" dirty="0">
                 <a:solidFill>
                   <a:srgbClr val="000000"/>
                 </a:solidFill>
@@ -11522,7 +11555,7 @@
           </a:p>
           <a:p>
             <a:r>
-              <a:rPr lang="en-US" altLang="ko-KR" b="0">
+              <a:rPr lang="en-US" altLang="ko-KR" b="0" dirty="0">
                 <a:solidFill>
                   <a:srgbClr val="000000"/>
                 </a:solidFill>
@@ -11533,7 +11566,7 @@
               <a:t>  </a:t>
             </a:r>
             <a:r>
-              <a:rPr lang="en-US" altLang="ko-KR" b="0">
+              <a:rPr lang="en-US" altLang="ko-KR" b="0" dirty="0">
                 <a:solidFill>
                   <a:srgbClr val="0000FF"/>
                 </a:solidFill>
@@ -11544,7 +11577,7 @@
               <a:t>return</a:t>
             </a:r>
             <a:r>
-              <a:rPr lang="en-US" altLang="ko-KR" b="0">
+              <a:rPr lang="en-US" altLang="ko-KR" b="0" dirty="0">
                 <a:solidFill>
                   <a:srgbClr val="000000"/>
                 </a:solidFill>
@@ -11555,7 +11588,7 @@
               <a:t> </a:t>
             </a:r>
             <a:r>
-              <a:rPr lang="en-US" altLang="ko-KR" b="0">
+              <a:rPr lang="en-US" altLang="ko-KR" b="0" dirty="0">
                 <a:solidFill>
                   <a:srgbClr val="0000FF"/>
                 </a:solidFill>
@@ -11566,7 +11599,7 @@
               <a:t>function</a:t>
             </a:r>
             <a:r>
-              <a:rPr lang="en-US" altLang="ko-KR" b="0">
+              <a:rPr lang="en-US" altLang="ko-KR" b="0" dirty="0">
                 <a:solidFill>
                   <a:srgbClr val="000000"/>
                 </a:solidFill>
@@ -11579,7 +11612,7 @@
           </a:p>
           <a:p>
             <a:r>
-              <a:rPr lang="en-US" altLang="ko-KR" b="0">
+              <a:rPr lang="en-US" altLang="ko-KR" b="0" dirty="0">
                 <a:solidFill>
                   <a:srgbClr val="000000"/>
                 </a:solidFill>
@@ -11590,7 +11623,7 @@
               <a:t>    </a:t>
             </a:r>
             <a:r>
-              <a:rPr lang="en-US" altLang="ko-KR" b="0">
+              <a:rPr lang="en-US" altLang="ko-KR" b="0" dirty="0">
                 <a:solidFill>
                   <a:srgbClr val="0000FF"/>
                 </a:solidFill>
@@ -11601,7 +11634,7 @@
               <a:t>return</a:t>
             </a:r>
             <a:r>
-              <a:rPr lang="en-US" altLang="ko-KR" b="0">
+              <a:rPr lang="en-US" altLang="ko-KR" b="0" dirty="0">
                 <a:solidFill>
                   <a:srgbClr val="000000"/>
                 </a:solidFill>
@@ -11609,10 +11642,54 @@
                 <a:latin typeface="Consolas" panose="020B0609020204030204" pitchFamily="49" charset="0"/>
                 <a:ea typeface="Noto Sans CJK KR Regular" panose="020B0500000000000000" pitchFamily="34" charset="-127"/>
               </a:rPr>
-              <a:t> fn.memo.apply(fn, </a:t>
-            </a:r>
-            <a:r>
-              <a:rPr lang="en-US" altLang="ko-KR" b="0">
+              <a:t> </a:t>
+            </a:r>
+            <a:r>
+              <a:rPr lang="en-US" altLang="ko-KR" b="0" dirty="0" err="1">
+                <a:solidFill>
+                  <a:srgbClr val="000000"/>
+                </a:solidFill>
+                <a:effectLst/>
+                <a:latin typeface="Consolas" panose="020B0609020204030204" pitchFamily="49" charset="0"/>
+                <a:ea typeface="Noto Sans CJK KR Regular" panose="020B0500000000000000" pitchFamily="34" charset="-127"/>
+              </a:rPr>
+              <a:t>fn.memo.apply</a:t>
+            </a:r>
+            <a:r>
+              <a:rPr lang="en-US" altLang="ko-KR" b="0" dirty="0">
+                <a:solidFill>
+                  <a:srgbClr val="000000"/>
+                </a:solidFill>
+                <a:effectLst/>
+                <a:latin typeface="Consolas" panose="020B0609020204030204" pitchFamily="49" charset="0"/>
+                <a:ea typeface="Noto Sans CJK KR Regular" panose="020B0500000000000000" pitchFamily="34" charset="-127"/>
+              </a:rPr>
+              <a:t>(</a:t>
+            </a:r>
+            <a:r>
+              <a:rPr lang="en-US" altLang="ko-KR" b="0" dirty="0" err="1">
+                <a:solidFill>
+                  <a:srgbClr val="000000"/>
+                </a:solidFill>
+                <a:effectLst/>
+                <a:latin typeface="Consolas" panose="020B0609020204030204" pitchFamily="49" charset="0"/>
+                <a:ea typeface="Noto Sans CJK KR Regular" panose="020B0500000000000000" pitchFamily="34" charset="-127"/>
+              </a:rPr>
+              <a:t>fn</a:t>
+            </a:r>
+            <a:r>
+              <a:rPr lang="en-US" altLang="ko-KR" b="0" dirty="0">
+                <a:solidFill>
+                  <a:srgbClr val="000000"/>
+                </a:solidFill>
+                <a:effectLst/>
+                <a:latin typeface="Consolas" panose="020B0609020204030204" pitchFamily="49" charset="0"/>
+                <a:ea typeface="Noto Sans CJK KR Regular" panose="020B0500000000000000" pitchFamily="34" charset="-127"/>
+              </a:rPr>
+              <a:t>, </a:t>
+            </a:r>
+            <a:r>
+              <a:rPr lang="en-US" altLang="ko-KR" b="0" dirty="0">
                 <a:solidFill>
                   <a:srgbClr val="0000FF"/>
                 </a:solidFill>
@@ -11623,7 +11700,7 @@
               <a:t>arguments</a:t>
             </a:r>
             <a:r>
-              <a:rPr lang="en-US" altLang="ko-KR" b="0">
+              <a:rPr lang="en-US" altLang="ko-KR" b="0" dirty="0">
                 <a:solidFill>
                   <a:srgbClr val="000000"/>
                 </a:solidFill>
@@ -11636,7 +11713,7 @@
           </a:p>
           <a:p>
             <a:r>
-              <a:rPr lang="en-US" altLang="ko-KR" b="0">
+              <a:rPr lang="en-US" altLang="ko-KR" b="0" dirty="0">
                 <a:solidFill>
                   <a:srgbClr val="000000"/>
                 </a:solidFill>
@@ -11649,7 +11726,7 @@
           </a:p>
           <a:p>
             <a:r>
-              <a:rPr lang="en-US" altLang="ko-KR" b="0">
+              <a:rPr lang="en-US" altLang="ko-KR" b="0" dirty="0">
                 <a:solidFill>
                   <a:srgbClr val="000000"/>
                 </a:solidFill>
@@ -11661,7 +11738,7 @@
             </a:r>
           </a:p>
           <a:p>
-            <a:endParaRPr lang="en-US" altLang="ko-KR" b="0">
+            <a:endParaRPr lang="en-US" altLang="ko-KR" b="0" dirty="0">
               <a:solidFill>
                 <a:srgbClr val="000000"/>
               </a:solidFill>
@@ -11671,7 +11748,7 @@
           </a:p>
           <a:p>
             <a:r>
-              <a:rPr lang="en-US" altLang="ko-KR" b="0">
+              <a:rPr lang="en-US" altLang="ko-KR" b="0" dirty="0" err="1">
                 <a:solidFill>
                   <a:srgbClr val="000000"/>
                 </a:solidFill>
@@ -11679,10 +11756,21 @@
                 <a:latin typeface="Consolas" panose="020B0609020204030204" pitchFamily="49" charset="0"/>
                 <a:ea typeface="Noto Sans CJK KR Regular" panose="020B0500000000000000" pitchFamily="34" charset="-127"/>
               </a:rPr>
-              <a:t>isPrime(</a:t>
-            </a:r>
-            <a:r>
-              <a:rPr lang="en-US" altLang="ko-KR" b="0">
+              <a:t>isPrime</a:t>
+            </a:r>
+            <a:r>
+              <a:rPr lang="en-US" altLang="ko-KR" b="0" dirty="0">
+                <a:solidFill>
+                  <a:srgbClr val="000000"/>
+                </a:solidFill>
+                <a:effectLst/>
+                <a:latin typeface="Consolas" panose="020B0609020204030204" pitchFamily="49" charset="0"/>
+                <a:ea typeface="Noto Sans CJK KR Regular" panose="020B0500000000000000" pitchFamily="34" charset="-127"/>
+              </a:rPr>
+              <a:t>(</a:t>
+            </a:r>
+            <a:r>
+              <a:rPr lang="en-US" altLang="ko-KR" b="0" dirty="0">
                 <a:solidFill>
                   <a:srgbClr val="098658"/>
                 </a:solidFill>
@@ -11693,7 +11781,7 @@
               <a:t>5</a:t>
             </a:r>
             <a:r>
-              <a:rPr lang="en-US" altLang="ko-KR" b="0">
+              <a:rPr lang="en-US" altLang="ko-KR" b="0" dirty="0">
                 <a:solidFill>
                   <a:srgbClr val="000000"/>
                 </a:solidFill>
@@ -11704,7 +11792,7 @@
               <a:t>); </a:t>
             </a:r>
             <a:r>
-              <a:rPr lang="en-US" altLang="ko-KR" b="0">
+              <a:rPr lang="en-US" altLang="ko-KR" b="0" dirty="0">
                 <a:solidFill>
                   <a:srgbClr val="098658"/>
                 </a:solidFill>
@@ -11715,16 +11803,26 @@
               <a:t>// </a:t>
             </a:r>
             <a:r>
-              <a:rPr lang="ko-KR" altLang="en-US">
+              <a:rPr lang="ko-KR" altLang="en-US" dirty="0" err="1">
                 <a:solidFill>
                   <a:srgbClr val="098658"/>
                 </a:solidFill>
                 <a:latin typeface="Consolas" panose="020B0609020204030204" pitchFamily="49" charset="0"/>
                 <a:ea typeface="Noto Sans CJK KR Regular" panose="020B0500000000000000" pitchFamily="34" charset="-127"/>
               </a:rPr>
-              <a:t>캐시되지 않음</a:t>
-            </a:r>
-            <a:endParaRPr lang="en-US" altLang="ko-KR" b="0">
+              <a:t>캐시되지</a:t>
+            </a:r>
+            <a:r>
+              <a:rPr lang="ko-KR" altLang="en-US" dirty="0">
+                <a:solidFill>
+                  <a:srgbClr val="098658"/>
+                </a:solidFill>
+                <a:latin typeface="Consolas" panose="020B0609020204030204" pitchFamily="49" charset="0"/>
+                <a:ea typeface="Noto Sans CJK KR Regular" panose="020B0500000000000000" pitchFamily="34" charset="-127"/>
+              </a:rPr>
+              <a:t> 않음</a:t>
+            </a:r>
+            <a:endParaRPr lang="en-US" altLang="ko-KR" b="0" dirty="0">
               <a:solidFill>
                 <a:srgbClr val="000000"/>
               </a:solidFill>
@@ -11734,7 +11832,7 @@
             </a:endParaRPr>
           </a:p>
           <a:p>
-            <a:endParaRPr lang="en-US" altLang="ko-KR" b="0">
+            <a:endParaRPr lang="en-US" altLang="ko-KR" b="0" dirty="0">
               <a:solidFill>
                 <a:srgbClr val="000000"/>
               </a:solidFill>
@@ -11744,7 +11842,7 @@
           </a:p>
           <a:p>
             <a:r>
-              <a:rPr lang="en-US" altLang="ko-KR" b="0">
+              <a:rPr lang="en-US" altLang="ko-KR" b="0" dirty="0" err="1">
                 <a:solidFill>
                   <a:srgbClr val="000000"/>
                 </a:solidFill>
@@ -11752,11 +11850,44 @@
                 <a:latin typeface="Consolas" panose="020B0609020204030204" pitchFamily="49" charset="0"/>
                 <a:ea typeface="Noto Sans CJK KR Regular" panose="020B0500000000000000" pitchFamily="34" charset="-127"/>
               </a:rPr>
-              <a:t>isPrime = isPrime.memoize();</a:t>
-            </a:r>
-          </a:p>
-          <a:p>
-            <a:endParaRPr lang="en-US" altLang="ko-KR" b="0">
+              <a:t>isPrime</a:t>
+            </a:r>
+            <a:r>
+              <a:rPr lang="en-US" altLang="ko-KR" b="0" dirty="0">
+                <a:solidFill>
+                  <a:srgbClr val="000000"/>
+                </a:solidFill>
+                <a:effectLst/>
+                <a:latin typeface="Consolas" panose="020B0609020204030204" pitchFamily="49" charset="0"/>
+                <a:ea typeface="Noto Sans CJK KR Regular" panose="020B0500000000000000" pitchFamily="34" charset="-127"/>
+              </a:rPr>
+              <a:t> = </a:t>
+            </a:r>
+            <a:r>
+              <a:rPr lang="en-US" altLang="ko-KR" b="0" dirty="0" err="1">
+                <a:solidFill>
+                  <a:srgbClr val="000000"/>
+                </a:solidFill>
+                <a:effectLst/>
+                <a:latin typeface="Consolas" panose="020B0609020204030204" pitchFamily="49" charset="0"/>
+                <a:ea typeface="Noto Sans CJK KR Regular" panose="020B0500000000000000" pitchFamily="34" charset="-127"/>
+              </a:rPr>
+              <a:t>isPrime.memoize</a:t>
+            </a:r>
+            <a:r>
+              <a:rPr lang="en-US" altLang="ko-KR" b="0" dirty="0">
+                <a:solidFill>
+                  <a:srgbClr val="000000"/>
+                </a:solidFill>
+                <a:effectLst/>
+                <a:latin typeface="Consolas" panose="020B0609020204030204" pitchFamily="49" charset="0"/>
+                <a:ea typeface="Noto Sans CJK KR Regular" panose="020B0500000000000000" pitchFamily="34" charset="-127"/>
+              </a:rPr>
+              <a:t>();</a:t>
+            </a:r>
+          </a:p>
+          <a:p>
+            <a:endParaRPr lang="en-US" altLang="ko-KR" b="0" dirty="0">
               <a:solidFill>
                 <a:srgbClr val="000000"/>
               </a:solidFill>
@@ -11766,7 +11897,7 @@
           </a:p>
           <a:p>
             <a:r>
-              <a:rPr lang="en-US" altLang="ko-KR" b="0">
+              <a:rPr lang="en-US" altLang="ko-KR" b="0" dirty="0" err="1">
                 <a:solidFill>
                   <a:srgbClr val="000000"/>
                 </a:solidFill>
@@ -11774,10 +11905,21 @@
                 <a:latin typeface="Consolas" panose="020B0609020204030204" pitchFamily="49" charset="0"/>
                 <a:ea typeface="Noto Sans CJK KR Regular" panose="020B0500000000000000" pitchFamily="34" charset="-127"/>
               </a:rPr>
-              <a:t>isPrime(</a:t>
-            </a:r>
-            <a:r>
-              <a:rPr lang="en-US" altLang="ko-KR" b="0">
+              <a:t>isPrime</a:t>
+            </a:r>
+            <a:r>
+              <a:rPr lang="en-US" altLang="ko-KR" b="0" dirty="0">
+                <a:solidFill>
+                  <a:srgbClr val="000000"/>
+                </a:solidFill>
+                <a:effectLst/>
+                <a:latin typeface="Consolas" panose="020B0609020204030204" pitchFamily="49" charset="0"/>
+                <a:ea typeface="Noto Sans CJK KR Regular" panose="020B0500000000000000" pitchFamily="34" charset="-127"/>
+              </a:rPr>
+              <a:t>(</a:t>
+            </a:r>
+            <a:r>
+              <a:rPr lang="en-US" altLang="ko-KR" b="0" dirty="0">
                 <a:solidFill>
                   <a:srgbClr val="098658"/>
                 </a:solidFill>
@@ -11788,7 +11930,7 @@
               <a:t>5</a:t>
             </a:r>
             <a:r>
-              <a:rPr lang="en-US" altLang="ko-KR" b="0">
+              <a:rPr lang="en-US" altLang="ko-KR" b="0" dirty="0">
                 <a:solidFill>
                   <a:srgbClr val="000000"/>
                 </a:solidFill>
@@ -11799,7 +11941,7 @@
               <a:t>)</a:t>
             </a:r>
             <a:r>
-              <a:rPr lang="en-US" altLang="ko-KR" b="0">
+              <a:rPr lang="en-US" altLang="ko-KR" b="0" dirty="0">
                 <a:solidFill>
                   <a:srgbClr val="000000"/>
                 </a:solidFill>
@@ -11809,7 +11951,7 @@
               <a:t>; </a:t>
             </a:r>
             <a:r>
-              <a:rPr lang="en-US" altLang="ko-KR" b="0">
+              <a:rPr lang="en-US" altLang="ko-KR" b="0" dirty="0">
                 <a:solidFill>
                   <a:srgbClr val="098658"/>
                 </a:solidFill>
@@ -11820,7 +11962,7 @@
               <a:t>// </a:t>
             </a:r>
             <a:r>
-              <a:rPr lang="ko-KR" altLang="en-US">
+              <a:rPr lang="ko-KR" altLang="en-US" dirty="0" err="1">
                 <a:solidFill>
                   <a:srgbClr val="098658"/>
                 </a:solidFill>
@@ -11829,7 +11971,7 @@
               </a:rPr>
               <a:t>캐시됨</a:t>
             </a:r>
-            <a:endParaRPr lang="en-US" altLang="ko-KR" b="0">
+            <a:endParaRPr lang="en-US" altLang="ko-KR" b="0" dirty="0">
               <a:solidFill>
                 <a:srgbClr val="000000"/>
               </a:solidFill>
@@ -13107,7 +13249,7 @@
                         <a:defRPr/>
                       </a:pPr>
                       <a:r>
-                        <a:rPr lang="en-US" sz="1600" b="1" kern="0">
+                        <a:rPr lang="en-US" sz="1600" b="1" kern="0" dirty="0">
                           <a:solidFill>
                             <a:srgbClr val="000000"/>
                           </a:solidFill>
@@ -13117,33 +13259,13 @@
                         <a:t>	</a:t>
                       </a:r>
                       <a:r>
-                        <a:rPr lang="en-US" altLang="ko-KR" sz="1600">
+                        <a:rPr lang="en-US" altLang="ko-KR" sz="1600" dirty="0">
                           <a:solidFill>
                             <a:srgbClr val="0000FF"/>
                           </a:solidFill>
                           <a:latin typeface="Consolas" panose="020B0609020204030204" pitchFamily="49" charset="0"/>
                         </a:rPr>
                         <a:t>const</a:t>
-                      </a:r>
-                      <a:r>
-                        <a:rPr lang="en-US" altLang="ko-KR" sz="1600" b="1" kern="0" baseline="0">
-                          <a:solidFill>
-                            <a:srgbClr val="000000"/>
-                          </a:solidFill>
-                          <a:latin typeface="Noto Sans CJK KR Regular" panose="020B0500000000000000" pitchFamily="34" charset="-127"/>
-                          <a:cs typeface="Times New Roman"/>
-                        </a:rPr>
-                        <a:t> </a:t>
-                      </a:r>
-                      <a:r>
-                        <a:rPr lang="en-US" altLang="ko-KR" sz="1600" b="1" kern="0" baseline="0" dirty="0" err="1">
-                          <a:solidFill>
-                            <a:srgbClr val="000000"/>
-                          </a:solidFill>
-                          <a:latin typeface="Noto Sans CJK KR Regular" panose="020B0500000000000000" pitchFamily="34" charset="-127"/>
-                          <a:cs typeface="Times New Roman"/>
-                        </a:rPr>
-                        <a:t>msg</a:t>
                       </a:r>
                       <a:r>
                         <a:rPr lang="en-US" altLang="ko-KR" sz="1600" b="1" kern="0" baseline="0" dirty="0">
@@ -13153,7 +13275,7 @@
                           <a:latin typeface="Noto Sans CJK KR Regular" panose="020B0500000000000000" pitchFamily="34" charset="-127"/>
                           <a:cs typeface="Times New Roman"/>
                         </a:rPr>
-                        <a:t> = </a:t>
+                        <a:t> msg = </a:t>
                       </a:r>
                       <a:r>
                         <a:rPr lang="en-US" altLang="ko-KR" sz="1600" b="1" kern="0" dirty="0">
@@ -15334,7 +15456,7 @@
                         </a:spcAft>
                       </a:pPr>
                       <a:r>
-                        <a:rPr lang="en-US" altLang="ko-KR" sz="1600" b="0">
+                        <a:rPr lang="en-US" altLang="ko-KR" sz="1600" b="0" dirty="0">
                           <a:solidFill>
                             <a:srgbClr val="0000FF"/>
                           </a:solidFill>
@@ -15345,16 +15467,6 @@
                         <a:t>let</a:t>
                       </a:r>
                       <a:r>
-                        <a:rPr lang="en-US" sz="1600" kern="0">
-                          <a:solidFill>
-                            <a:srgbClr val="000000"/>
-                          </a:solidFill>
-                          <a:latin typeface="Consolas" panose="020B0609020204030204" pitchFamily="49" charset="0"/>
-                          <a:cs typeface="Times New Roman"/>
-                        </a:rPr>
-                        <a:t> </a:t>
-                      </a:r>
-                      <a:r>
                         <a:rPr lang="en-US" sz="1600" kern="0" dirty="0">
                           <a:solidFill>
                             <a:srgbClr val="000000"/>
@@ -15362,7 +15474,7 @@
                           <a:latin typeface="Consolas" panose="020B0609020204030204" pitchFamily="49" charset="0"/>
                           <a:cs typeface="Times New Roman"/>
                         </a:rPr>
-                        <a:t>count = 0;</a:t>
+                        <a:t> count = 0;</a:t>
                       </a:r>
                       <a:endParaRPr lang="ko-KR" sz="1600" kern="100" dirty="0">
                         <a:latin typeface="Consolas" panose="020B0609020204030204" pitchFamily="49" charset="0"/>
@@ -15377,7 +15489,7 @@
                         </a:spcAft>
                       </a:pPr>
                       <a:r>
-                        <a:rPr lang="en-US" altLang="ko-KR" sz="1600" b="0">
+                        <a:rPr lang="en-US" altLang="ko-KR" sz="1600" b="0" dirty="0">
                           <a:solidFill>
                             <a:srgbClr val="0000FF"/>
                           </a:solidFill>
@@ -15388,16 +15500,6 @@
                         <a:t>let</a:t>
                       </a:r>
                       <a:r>
-                        <a:rPr lang="en-US" sz="1600" kern="0">
-                          <a:solidFill>
-                            <a:srgbClr val="000000"/>
-                          </a:solidFill>
-                          <a:latin typeface="Consolas" panose="020B0609020204030204" pitchFamily="49" charset="0"/>
-                          <a:cs typeface="Times New Roman"/>
-                        </a:rPr>
-                        <a:t> </a:t>
-                      </a:r>
-                      <a:r>
                         <a:rPr lang="en-US" sz="1600" kern="0" dirty="0">
                           <a:solidFill>
                             <a:srgbClr val="000000"/>
@@ -15405,7 +15507,7 @@
                           <a:latin typeface="Consolas" panose="020B0609020204030204" pitchFamily="49" charset="0"/>
                           <a:cs typeface="Times New Roman"/>
                         </a:rPr>
-                        <a:t>sum = 100;</a:t>
+                        <a:t> sum = 100;</a:t>
                       </a:r>
                       <a:endParaRPr lang="ko-KR" sz="1600" kern="100" dirty="0">
                         <a:latin typeface="Consolas" panose="020B0609020204030204" pitchFamily="49" charset="0"/>
@@ -15420,7 +15522,7 @@
                         </a:spcAft>
                       </a:pPr>
                       <a:r>
-                        <a:rPr lang="en-US" altLang="ko-KR" sz="1600" b="0">
+                        <a:rPr lang="en-US" altLang="ko-KR" sz="1600" b="0" dirty="0">
                           <a:solidFill>
                             <a:srgbClr val="0000FF"/>
                           </a:solidFill>
@@ -15431,26 +15533,6 @@
                         <a:t>let</a:t>
                       </a:r>
                       <a:r>
-                        <a:rPr lang="en-US" sz="1600" kern="0">
-                          <a:solidFill>
-                            <a:srgbClr val="000000"/>
-                          </a:solidFill>
-                          <a:latin typeface="Consolas" panose="020B0609020204030204" pitchFamily="49" charset="0"/>
-                          <a:cs typeface="Times New Roman"/>
-                        </a:rPr>
-                        <a:t> </a:t>
-                      </a:r>
-                      <a:r>
-                        <a:rPr lang="en-US" sz="1600" kern="0" dirty="0" err="1">
-                          <a:solidFill>
-                            <a:srgbClr val="000000"/>
-                          </a:solidFill>
-                          <a:latin typeface="Consolas" panose="020B0609020204030204" pitchFamily="49" charset="0"/>
-                          <a:cs typeface="Times New Roman"/>
-                        </a:rPr>
-                        <a:t>avg</a:t>
-                      </a:r>
-                      <a:r>
                         <a:rPr lang="en-US" sz="1600" kern="0" dirty="0">
                           <a:solidFill>
                             <a:srgbClr val="000000"/>
@@ -15458,7 +15540,7 @@
                           <a:latin typeface="Consolas" panose="020B0609020204030204" pitchFamily="49" charset="0"/>
                           <a:cs typeface="Times New Roman"/>
                         </a:rPr>
-                        <a:t> = 0;</a:t>
+                        <a:t> avg = 0;</a:t>
                       </a:r>
                       <a:endParaRPr lang="ko-KR" sz="1600" kern="100" dirty="0">
                         <a:latin typeface="Consolas" panose="020B0609020204030204" pitchFamily="49" charset="0"/>
@@ -15512,7 +15594,7 @@
                         </a:spcAft>
                       </a:pPr>
                       <a:r>
-                        <a:rPr lang="en-US" altLang="ko-KR" sz="1600" kern="0">
+                        <a:rPr lang="en-US" altLang="ko-KR" sz="1600" kern="0" dirty="0">
                           <a:solidFill>
                             <a:srgbClr val="000000"/>
                           </a:solidFill>
@@ -15521,59 +15603,6 @@
                           <a:cs typeface="Times New Roman"/>
                         </a:rPr>
                         <a:t>(() =&gt; {</a:t>
-                      </a:r>
-                      <a:endParaRPr lang="ko-KR" sz="1600" kern="100" dirty="0">
-                        <a:latin typeface="Consolas" panose="020B0609020204030204" pitchFamily="49" charset="0"/>
-                        <a:ea typeface="Noto Sans CJK KR Regular" panose="020B0500000000000000" pitchFamily="34" charset="-127"/>
-                        <a:cs typeface="Times New Roman"/>
-                      </a:endParaRPr>
-                    </a:p>
-                    <a:p>
-                      <a:pPr algn="l" latinLnBrk="0">
-                        <a:spcAft>
-                          <a:spcPts val="0"/>
-                        </a:spcAft>
-                      </a:pPr>
-                      <a:r>
-                        <a:rPr lang="en-US" sz="1600" kern="0">
-                          <a:solidFill>
-                            <a:srgbClr val="000000"/>
-                          </a:solidFill>
-                          <a:latin typeface="Consolas" panose="020B0609020204030204" pitchFamily="49" charset="0"/>
-                          <a:cs typeface="Times New Roman"/>
-                        </a:rPr>
-                        <a:t>	</a:t>
-                      </a:r>
-                      <a:r>
-                        <a:rPr lang="en-US" altLang="ko-KR" sz="1600" b="0">
-                          <a:solidFill>
-                            <a:srgbClr val="0000FF"/>
-                          </a:solidFill>
-                          <a:effectLst/>
-                          <a:latin typeface="Consolas" panose="020B0609020204030204" pitchFamily="49" charset="0"/>
-                          <a:ea typeface="Noto Sans CJK KR Regular" panose="020B0500000000000000" pitchFamily="34" charset="-127"/>
-                        </a:rPr>
-                        <a:t>let</a:t>
-                      </a:r>
-                      <a:r>
-                        <a:rPr lang="en-US" sz="1600" kern="0">
-                          <a:solidFill>
-                            <a:srgbClr val="000000"/>
-                          </a:solidFill>
-                          <a:latin typeface="Consolas" panose="020B0609020204030204" pitchFamily="49" charset="0"/>
-                          <a:cs typeface="Times New Roman"/>
-                        </a:rPr>
-                        <a:t> </a:t>
-                      </a:r>
-                      <a:r>
-                        <a:rPr lang="en-US" sz="1600" kern="0" dirty="0">
-                          <a:solidFill>
-                            <a:srgbClr val="000000"/>
-                          </a:solidFill>
-                          <a:latin typeface="Consolas" panose="020B0609020204030204" pitchFamily="49" charset="0"/>
-                          <a:cs typeface="Times New Roman"/>
-                        </a:rPr>
-                        <a:t>sum = 0;</a:t>
                       </a:r>
                       <a:endParaRPr lang="ko-KR" sz="1600" kern="100" dirty="0">
                         <a:latin typeface="Consolas" panose="020B0609020204030204" pitchFamily="49" charset="0"/>
@@ -15598,27 +15627,7 @@
                         <a:t>	</a:t>
                       </a:r>
                       <a:r>
-                        <a:rPr lang="en-US" sz="1600" b="1" kern="0">
-                          <a:solidFill>
-                            <a:srgbClr val="7F0055"/>
-                          </a:solidFill>
-                          <a:latin typeface="Consolas" panose="020B0609020204030204" pitchFamily="49" charset="0"/>
-                          <a:cs typeface="Times New Roman"/>
-                        </a:rPr>
-                        <a:t>for</a:t>
-                      </a:r>
-                      <a:r>
-                        <a:rPr lang="en-US" sz="1600" kern="0">
-                          <a:solidFill>
-                            <a:srgbClr val="000000"/>
-                          </a:solidFill>
-                          <a:latin typeface="Consolas" panose="020B0609020204030204" pitchFamily="49" charset="0"/>
-                          <a:cs typeface="Times New Roman"/>
-                        </a:rPr>
-                        <a:t>(</a:t>
-                      </a:r>
-                      <a:r>
-                        <a:rPr lang="en-US" altLang="ko-KR" sz="1600" b="0">
+                        <a:rPr lang="en-US" altLang="ko-KR" sz="1600" b="0" dirty="0">
                           <a:solidFill>
                             <a:srgbClr val="0000FF"/>
                           </a:solidFill>
@@ -15629,7 +15638,70 @@
                         <a:t>let</a:t>
                       </a:r>
                       <a:r>
-                        <a:rPr lang="en-US" sz="1600" kern="0">
+                        <a:rPr lang="en-US" sz="1600" kern="0" dirty="0">
+                          <a:solidFill>
+                            <a:srgbClr val="000000"/>
+                          </a:solidFill>
+                          <a:latin typeface="Consolas" panose="020B0609020204030204" pitchFamily="49" charset="0"/>
+                          <a:cs typeface="Times New Roman"/>
+                        </a:rPr>
+                        <a:t> sum = 0;</a:t>
+                      </a:r>
+                      <a:endParaRPr lang="ko-KR" sz="1600" kern="100" dirty="0">
+                        <a:latin typeface="Consolas" panose="020B0609020204030204" pitchFamily="49" charset="0"/>
+                        <a:ea typeface="Noto Sans CJK KR Regular" panose="020B0500000000000000" pitchFamily="34" charset="-127"/>
+                        <a:cs typeface="Times New Roman"/>
+                      </a:endParaRPr>
+                    </a:p>
+                    <a:p>
+                      <a:pPr algn="l" latinLnBrk="0">
+                        <a:spcAft>
+                          <a:spcPts val="0"/>
+                        </a:spcAft>
+                      </a:pPr>
+                      <a:r>
+                        <a:rPr lang="en-US" sz="1600" kern="0" dirty="0">
+                          <a:solidFill>
+                            <a:srgbClr val="000000"/>
+                          </a:solidFill>
+                          <a:latin typeface="Consolas" panose="020B0609020204030204" pitchFamily="49" charset="0"/>
+                          <a:cs typeface="Times New Roman"/>
+                        </a:rPr>
+                        <a:t>	</a:t>
+                      </a:r>
+                      <a:r>
+                        <a:rPr lang="en-US" sz="1600" b="1" kern="0" dirty="0">
+                          <a:solidFill>
+                            <a:srgbClr val="7F0055"/>
+                          </a:solidFill>
+                          <a:latin typeface="Consolas" panose="020B0609020204030204" pitchFamily="49" charset="0"/>
+                          <a:cs typeface="Times New Roman"/>
+                        </a:rPr>
+                        <a:t>for</a:t>
+                      </a:r>
+                      <a:r>
+                        <a:rPr lang="en-US" sz="1600" kern="0" dirty="0">
+                          <a:solidFill>
+                            <a:srgbClr val="000000"/>
+                          </a:solidFill>
+                          <a:latin typeface="Consolas" panose="020B0609020204030204" pitchFamily="49" charset="0"/>
+                          <a:cs typeface="Times New Roman"/>
+                        </a:rPr>
+                        <a:t>(</a:t>
+                      </a:r>
+                      <a:r>
+                        <a:rPr lang="en-US" altLang="ko-KR" sz="1600" b="0" dirty="0">
+                          <a:solidFill>
+                            <a:srgbClr val="0000FF"/>
+                          </a:solidFill>
+                          <a:effectLst/>
+                          <a:latin typeface="Consolas" panose="020B0609020204030204" pitchFamily="49" charset="0"/>
+                          <a:ea typeface="Noto Sans CJK KR Regular" panose="020B0500000000000000" pitchFamily="34" charset="-127"/>
+                        </a:rPr>
+                        <a:t>let</a:t>
+                      </a:r>
+                      <a:r>
+                        <a:rPr lang="en-US" sz="1600" kern="0" dirty="0">
                           <a:solidFill>
                             <a:srgbClr val="000000"/>
                           </a:solidFill>
@@ -15847,7 +15919,7 @@
                         </a:spcAft>
                       </a:pPr>
                       <a:r>
-                        <a:rPr lang="en-US" altLang="ko-KR" sz="1600" kern="0">
+                        <a:rPr lang="en-US" altLang="ko-KR" sz="1600" kern="0" dirty="0">
                           <a:solidFill>
                             <a:srgbClr val="3F7F5F"/>
                           </a:solidFill>
@@ -16468,17 +16540,10 @@
                 <a:latin typeface="Noto Sans CJK KR Regular" panose="020B0500000000000000" pitchFamily="34" charset="-127"/>
                 <a:ea typeface="Noto Sans CJK KR Regular" panose="020B0500000000000000" pitchFamily="34" charset="-127"/>
               </a:rPr>
-              <a:t>여러 라이브러리를 로딩하면서 발생하는 이름 충돌을 막을 수 </a:t>
-            </a:r>
-            <a:r>
-              <a:rPr lang="ko-KR" altLang="en-US" b="0">
-                <a:latin typeface="Noto Sans CJK KR Regular" panose="020B0500000000000000" pitchFamily="34" charset="-127"/>
-                <a:ea typeface="Noto Sans CJK KR Regular" panose="020B0500000000000000" pitchFamily="34" charset="-127"/>
-              </a:rPr>
-              <a:t>있다</a:t>
-            </a:r>
-            <a:r>
-              <a:rPr lang="en-US" altLang="ko-KR" b="0">
+              <a:t>여러 라이브러리를 로딩하면서 발생하는 이름 충돌을 막을 수 있다</a:t>
+            </a:r>
+            <a:r>
+              <a:rPr lang="en-US" altLang="ko-KR" b="0" dirty="0">
                 <a:latin typeface="Noto Sans CJK KR Regular" panose="020B0500000000000000" pitchFamily="34" charset="-127"/>
                 <a:ea typeface="Noto Sans CJK KR Regular" panose="020B0500000000000000" pitchFamily="34" charset="-127"/>
               </a:rPr>
@@ -16490,7 +16555,7 @@
               <a:buFontTx/>
               <a:buChar char="•"/>
             </a:pPr>
-            <a:endParaRPr lang="en-US" altLang="ko-KR" b="0">
+            <a:endParaRPr lang="en-US" altLang="ko-KR" b="0" dirty="0">
               <a:latin typeface="Noto Sans CJK KR Regular" panose="020B0500000000000000" pitchFamily="34" charset="-127"/>
               <a:ea typeface="Noto Sans CJK KR Regular" panose="020B0500000000000000" pitchFamily="34" charset="-127"/>
             </a:endParaRPr>
@@ -16501,18 +16566,25 @@
               <a:buChar char="▶"/>
             </a:pPr>
             <a:r>
-              <a:rPr lang="en-US" altLang="ko-KR" sz="2000">
+              <a:rPr lang="en-US" altLang="ko-KR" sz="2000" dirty="0">
                 <a:latin typeface="Noto Sans CJK KR Regular" panose="020B0500000000000000" pitchFamily="34" charset="-127"/>
                 <a:ea typeface="Noto Sans CJK KR Regular" panose="020B0500000000000000" pitchFamily="34" charset="-127"/>
               </a:rPr>
               <a:t> </a:t>
             </a:r>
             <a:r>
-              <a:rPr lang="ko-KR" altLang="en-US" sz="2000">
+              <a:rPr lang="ko-KR" altLang="en-US" sz="2000" dirty="0" err="1">
                 <a:latin typeface="Noto Sans CJK KR Regular" panose="020B0500000000000000" pitchFamily="34" charset="-127"/>
                 <a:ea typeface="Noto Sans CJK KR Regular" panose="020B0500000000000000" pitchFamily="34" charset="-127"/>
               </a:rPr>
-              <a:t>변수명 대체</a:t>
+              <a:t>변수명</a:t>
+            </a:r>
+            <a:r>
+              <a:rPr lang="ko-KR" altLang="en-US" sz="2000" dirty="0">
+                <a:latin typeface="Noto Sans CJK KR Regular" panose="020B0500000000000000" pitchFamily="34" charset="-127"/>
+                <a:ea typeface="Noto Sans CJK KR Regular" panose="020B0500000000000000" pitchFamily="34" charset="-127"/>
+              </a:rPr>
+              <a:t> 대체</a:t>
             </a:r>
           </a:p>
           <a:p>
@@ -16521,27 +16593,34 @@
               <a:buChar char="•"/>
             </a:pPr>
             <a:r>
-              <a:rPr lang="ko-KR" altLang="en-US" b="0">
+              <a:rPr lang="ko-KR" altLang="en-US" b="0" dirty="0">
                 <a:latin typeface="Noto Sans CJK KR Regular" panose="020B0500000000000000" pitchFamily="34" charset="-127"/>
                 <a:ea typeface="Noto Sans CJK KR Regular" panose="020B0500000000000000" pitchFamily="34" charset="-127"/>
               </a:rPr>
               <a:t> </a:t>
             </a:r>
             <a:r>
-              <a:rPr lang="en-US" altLang="ko-KR" b="0">
+              <a:rPr lang="en-US" altLang="ko-KR" b="0" dirty="0" err="1">
                 <a:latin typeface="Noto Sans CJK KR Regular" panose="020B0500000000000000" pitchFamily="34" charset="-127"/>
                 <a:ea typeface="Noto Sans CJK KR Regular" panose="020B0500000000000000" pitchFamily="34" charset="-127"/>
               </a:rPr>
-              <a:t>Some.long.reference.to.something </a:t>
-            </a:r>
-            <a:r>
-              <a:rPr lang="ko-KR" altLang="en-US" b="0">
+              <a:t>Some.long.reference.to.something</a:t>
+            </a:r>
+            <a:r>
+              <a:rPr lang="en-US" altLang="ko-KR" b="0" dirty="0">
                 <a:latin typeface="Noto Sans CJK KR Regular" panose="020B0500000000000000" pitchFamily="34" charset="-127"/>
                 <a:ea typeface="Noto Sans CJK KR Regular" panose="020B0500000000000000" pitchFamily="34" charset="-127"/>
               </a:rPr>
+              <a:t> </a:t>
+            </a:r>
+            <a:r>
+              <a:rPr lang="ko-KR" altLang="en-US" b="0" dirty="0">
+                <a:latin typeface="Noto Sans CJK KR Regular" panose="020B0500000000000000" pitchFamily="34" charset="-127"/>
+                <a:ea typeface="Noto Sans CJK KR Regular" panose="020B0500000000000000" pitchFamily="34" charset="-127"/>
+              </a:rPr>
               <a:t>같은 복잡한 참조 관계를 짧은 변수로 대체</a:t>
             </a:r>
-            <a:endParaRPr lang="en-US" altLang="ko-KR" b="0">
+            <a:endParaRPr lang="en-US" altLang="ko-KR" b="0" dirty="0">
               <a:latin typeface="Noto Sans CJK KR Regular" panose="020B0500000000000000" pitchFamily="34" charset="-127"/>
               <a:ea typeface="Noto Sans CJK KR Regular" panose="020B0500000000000000" pitchFamily="34" charset="-127"/>
             </a:endParaRPr>
@@ -17599,7 +17678,7 @@
           <p:nvPr>
             <p:extLst>
               <p:ext uri="{D42A27DB-BD31-4B8C-83A1-F6EECF244321}">
-                <p14:modId xmlns:p14="http://schemas.microsoft.com/office/powerpoint/2010/main" val="319587772"/>
+                <p14:modId xmlns:p14="http://schemas.microsoft.com/office/powerpoint/2010/main" val="1892563974"/>
               </p:ext>
             </p:extLst>
           </p:nvPr>
@@ -17870,7 +17949,7 @@
                         </a:spcAft>
                       </a:pPr>
                       <a:r>
-                        <a:rPr lang="en-US" sz="1600" kern="0">
+                        <a:rPr lang="en-US" sz="1600" kern="0" dirty="0">
                           <a:solidFill>
                             <a:srgbClr val="000000"/>
                           </a:solidFill>
@@ -17880,53 +17959,49 @@
                         <a:t>	</a:t>
                       </a:r>
                       <a:r>
-                        <a:rPr lang="en-US" altLang="ko-KR" sz="1600">
+                        <a:rPr lang="en-US" altLang="ko-KR" sz="1600" dirty="0">
                           <a:solidFill>
                             <a:srgbClr val="0000FF"/>
                           </a:solidFill>
                           <a:latin typeface="Consolas" panose="020B0609020204030204" pitchFamily="49" charset="0"/>
                         </a:rPr>
-                        <a:t>const</a:t>
+                        <a:t>const </a:t>
                       </a:r>
                       <a:r>
-                        <a:rPr lang="en-US" sz="1600" kern="0">
+                        <a:rPr lang="en-US" altLang="ko-KR" sz="1600" dirty="0" err="1">
                           <a:solidFill>
-                            <a:srgbClr val="000000"/>
+                            <a:srgbClr val="0000FF"/>
                           </a:solidFill>
                           <a:latin typeface="Consolas" panose="020B0609020204030204" pitchFamily="49" charset="0"/>
-                          <a:cs typeface="Times New Roman"/>
                         </a:rPr>
-                        <a:t> btn </a:t>
+                        <a:t>btns</a:t>
                       </a:r>
                       <a:r>
-                        <a:rPr lang="en-US" sz="1600" kern="0" dirty="0">
+                        <a:rPr lang="en-US" altLang="ko-KR" sz="1600" dirty="0">
                           <a:solidFill>
-                            <a:srgbClr val="000000"/>
+                            <a:srgbClr val="0000FF"/>
                           </a:solidFill>
                           <a:latin typeface="Consolas" panose="020B0609020204030204" pitchFamily="49" charset="0"/>
-                          <a:cs typeface="Times New Roman"/>
                         </a:rPr>
-                        <a:t>= $(</a:t>
+                        <a:t> = </a:t>
                       </a:r>
                       <a:r>
-                        <a:rPr lang="en-US" sz="1600" kern="0" dirty="0">
+                        <a:rPr lang="en-US" altLang="ko-KR" sz="1600" dirty="0" err="1">
                           <a:solidFill>
-                            <a:srgbClr val="2A00FF"/>
+                            <a:srgbClr val="0000FF"/>
                           </a:solidFill>
                           <a:latin typeface="Consolas" panose="020B0609020204030204" pitchFamily="49" charset="0"/>
-                          <a:cs typeface="Times New Roman"/>
                         </a:rPr>
-                        <a:t>"button"</a:t>
+                        <a:t>document.querySelectorAll</a:t>
                       </a:r>
                       <a:r>
-                        <a:rPr lang="en-US" sz="1600" kern="0" dirty="0">
+                        <a:rPr lang="en-US" altLang="ko-KR" sz="1600" dirty="0">
                           <a:solidFill>
-                            <a:srgbClr val="000000"/>
+                            <a:srgbClr val="0000FF"/>
                           </a:solidFill>
                           <a:latin typeface="Consolas" panose="020B0609020204030204" pitchFamily="49" charset="0"/>
-                          <a:cs typeface="Times New Roman"/>
                         </a:rPr>
-                        <a:t>);</a:t>
+                        <a:t>('button');</a:t>
                       </a:r>
                       <a:endParaRPr lang="ko-KR" sz="1600" kern="100" dirty="0">
                         <a:latin typeface="Consolas" panose="020B0609020204030204" pitchFamily="49" charset="0"/>
@@ -17950,7 +18025,7 @@
                         <a:t>	</a:t>
                       </a:r>
                       <a:r>
-                        <a:rPr lang="en-US" sz="1600" b="1" kern="0">
+                        <a:rPr lang="en-US" sz="1600" b="1" kern="0" dirty="0">
                           <a:solidFill>
                             <a:srgbClr val="7F0055"/>
                           </a:solidFill>
@@ -17960,7 +18035,7 @@
                         <a:t>for</a:t>
                       </a:r>
                       <a:r>
-                        <a:rPr lang="en-US" sz="1600" kern="0">
+                        <a:rPr lang="en-US" sz="1600" kern="0" dirty="0">
                           <a:solidFill>
                             <a:srgbClr val="000000"/>
                           </a:solidFill>
@@ -17970,7 +18045,7 @@
                         <a:t>(</a:t>
                       </a:r>
                       <a:r>
-                        <a:rPr lang="en-US" altLang="ko-KR" sz="1600" b="0">
+                        <a:rPr lang="en-US" altLang="ko-KR" sz="1600" b="0" dirty="0">
                           <a:solidFill>
                             <a:srgbClr val="0000FF"/>
                           </a:solidFill>
@@ -17981,7 +18056,7 @@
                         <a:t>let</a:t>
                       </a:r>
                       <a:r>
-                        <a:rPr lang="en-US" sz="1600" kern="0">
+                        <a:rPr lang="en-US" sz="1600" kern="0" dirty="0">
                           <a:solidFill>
                             <a:srgbClr val="000000"/>
                           </a:solidFill>
@@ -18089,17 +18164,17 @@
                           <a:latin typeface="Consolas" panose="020B0609020204030204" pitchFamily="49" charset="0"/>
                           <a:cs typeface="Times New Roman"/>
                         </a:rPr>
-                        <a:t>	</a:t>
+                        <a:t>		((</a:t>
                       </a:r>
                       <a:r>
-                        <a:rPr lang="en-US" sz="1600" kern="0">
+                        <a:rPr lang="en-US" sz="1600" kern="0" dirty="0" err="1">
                           <a:solidFill>
                             <a:srgbClr val="000000"/>
                           </a:solidFill>
                           <a:latin typeface="Consolas" panose="020B0609020204030204" pitchFamily="49" charset="0"/>
                           <a:cs typeface="Times New Roman"/>
                         </a:rPr>
-                        <a:t>	((i) =&gt; {</a:t>
+                        <a:t>i</a:t>
                       </a:r>
                       <a:r>
                         <a:rPr lang="en-US" sz="1600" kern="0" dirty="0">
@@ -18109,7 +18184,7 @@
                           <a:latin typeface="Consolas" panose="020B0609020204030204" pitchFamily="49" charset="0"/>
                           <a:cs typeface="Times New Roman"/>
                         </a:rPr>
-                        <a:t>			</a:t>
+                        <a:t>) =&gt; {			</a:t>
                       </a:r>
                       <a:r>
                         <a:rPr lang="en-US" altLang="ko-KR" sz="1600" kern="0" dirty="0">
@@ -18119,20 +18194,10 @@
                           <a:latin typeface="Consolas" panose="020B0609020204030204" pitchFamily="49" charset="0"/>
                           <a:cs typeface="Times New Roman"/>
                         </a:rPr>
-                        <a:t>	</a:t>
+                        <a:t>			</a:t>
                       </a:r>
                       <a:r>
-                        <a:rPr lang="en-US" altLang="ko-KR" sz="1600" kern="0">
-                          <a:solidFill>
-                            <a:srgbClr val="000000"/>
-                          </a:solidFill>
-                          <a:latin typeface="Consolas" panose="020B0609020204030204" pitchFamily="49" charset="0"/>
-                          <a:cs typeface="Times New Roman"/>
-                        </a:rPr>
-                        <a:t>		</a:t>
-                      </a:r>
-                      <a:r>
-                        <a:rPr lang="en-US" sz="1600" kern="0">
+                        <a:rPr lang="en-US" sz="1600" kern="0" dirty="0" err="1">
                           <a:solidFill>
                             <a:srgbClr val="000000"/>
                           </a:solidFill>
@@ -18149,37 +18214,7 @@
                           <a:latin typeface="Consolas" panose="020B0609020204030204" pitchFamily="49" charset="0"/>
                           <a:cs typeface="Times New Roman"/>
                         </a:rPr>
-                        <a:t>[i].</a:t>
-                      </a:r>
-                      <a:r>
-                        <a:rPr lang="en-US" sz="1600" kern="0" dirty="0" err="1">
-                          <a:solidFill>
-                            <a:srgbClr val="000000"/>
-                          </a:solidFill>
-                          <a:latin typeface="Consolas" panose="020B0609020204030204" pitchFamily="49" charset="0"/>
-                          <a:cs typeface="Times New Roman"/>
-                        </a:rPr>
-                        <a:t>onclick</a:t>
-                      </a:r>
-                      <a:r>
-                        <a:rPr lang="en-US" sz="1600" kern="0" dirty="0">
-                          <a:solidFill>
-                            <a:srgbClr val="000000"/>
-                          </a:solidFill>
-                          <a:latin typeface="Consolas" panose="020B0609020204030204" pitchFamily="49" charset="0"/>
-                          <a:cs typeface="Times New Roman"/>
-                        </a:rPr>
-                        <a:t> </a:t>
-                      </a:r>
-                      <a:r>
-                        <a:rPr lang="en-US" sz="1600" kern="0">
-                          <a:solidFill>
-                            <a:srgbClr val="000000"/>
-                          </a:solidFill>
-                          <a:latin typeface="Consolas" panose="020B0609020204030204" pitchFamily="49" charset="0"/>
-                          <a:cs typeface="Times New Roman"/>
-                        </a:rPr>
-                        <a:t>= () =&gt; {</a:t>
+                        <a:t>[i].onclick = () =&gt; {</a:t>
                       </a:r>
                       <a:endParaRPr lang="ko-KR" sz="1600" kern="100" dirty="0">
                         <a:latin typeface="Consolas" panose="020B0609020204030204" pitchFamily="49" charset="0"/>

</xml_diff>